<commit_message>
looks like I haven't pushed for a while
</commit_message>
<xml_diff>
--- a/turtle/Python and Turtle WOLP Jan 15.pptx
+++ b/turtle/Python and Turtle WOLP Jan 15.pptx
@@ -8384,17 +8384,19 @@
           </a:fontRef>
         </p:style>
         <p:txBody>
-          <a:bodyPr rtlCol="0" anchor="ctr"/>
+          <a:bodyPr rtlCol="0" anchor="ctr">
+            <a:normAutofit/>
+          </a:bodyPr>
           <a:lstStyle/>
           <a:p>
             <a:pPr algn="ctr"/>
             <a:r>
-              <a:rPr lang="en-US" sz="4800" b="1" dirty="0" smtClean="0">
+              <a:rPr lang="en-US" sz="2800" b="1" dirty="0" smtClean="0">
                 <a:solidFill>
                   <a:schemeClr val="bg1"/>
                 </a:solidFill>
-                <a:latin typeface="Futura Condensed"/>
-                <a:cs typeface="Futura Condensed"/>
+                <a:latin typeface="Helvetica"/>
+                <a:cs typeface="Helvetica"/>
               </a:rPr>
               <a:t>PYTHON</a:t>
             </a:r>
@@ -8402,58 +8404,58 @@
           <a:p>
             <a:pPr algn="ctr"/>
             <a:r>
-              <a:rPr lang="en-US" sz="5400" b="1" dirty="0" smtClean="0">
+              <a:rPr lang="en-US" sz="2800" b="1" dirty="0" smtClean="0">
                 <a:solidFill>
                   <a:schemeClr val="bg1"/>
                 </a:solidFill>
-                <a:latin typeface="Futura Condensed"/>
-                <a:cs typeface="Futura Condensed"/>
+                <a:latin typeface="Helvetica"/>
+                <a:cs typeface="Helvetica"/>
               </a:rPr>
               <a:t>TURTLE</a:t>
             </a:r>
           </a:p>
           <a:p>
             <a:pPr algn="ctr"/>
-            <a:endParaRPr lang="en-US" sz="3200" b="1" dirty="0">
+            <a:endParaRPr lang="en-US" sz="2800" b="1" dirty="0">
               <a:solidFill>
                 <a:schemeClr val="bg1"/>
               </a:solidFill>
-              <a:latin typeface="Futura Condensed"/>
-              <a:cs typeface="Futura Condensed"/>
+              <a:latin typeface="Helvetica"/>
+              <a:cs typeface="Helvetica"/>
             </a:endParaRPr>
           </a:p>
           <a:p>
             <a:pPr algn="ctr"/>
             <a:r>
-              <a:rPr lang="en-US" sz="3200" b="1" dirty="0" smtClean="0">
+              <a:rPr lang="en-US" sz="2800" b="1" dirty="0" smtClean="0">
                 <a:solidFill>
                   <a:schemeClr val="bg1"/>
                 </a:solidFill>
-                <a:latin typeface="Futura Condensed"/>
-                <a:cs typeface="Futura Condensed"/>
+                <a:latin typeface="Helvetica"/>
+                <a:cs typeface="Helvetica"/>
               </a:rPr>
               <a:t>WOLP Jan 15</a:t>
             </a:r>
           </a:p>
           <a:p>
             <a:pPr algn="ctr"/>
-            <a:endParaRPr lang="en-US" sz="3200" b="1" dirty="0">
+            <a:endParaRPr lang="en-US" sz="2800" b="1" dirty="0">
               <a:solidFill>
                 <a:schemeClr val="bg1"/>
               </a:solidFill>
-              <a:latin typeface="Futura Condensed"/>
-              <a:cs typeface="Futura Condensed"/>
+              <a:latin typeface="Helvetica"/>
+              <a:cs typeface="Helvetica"/>
             </a:endParaRPr>
           </a:p>
           <a:p>
             <a:pPr algn="ctr"/>
             <a:r>
-              <a:rPr lang="en-US" sz="3200" b="1" dirty="0" smtClean="0">
+              <a:rPr lang="en-US" sz="2800" b="1" dirty="0" smtClean="0">
                 <a:solidFill>
                   <a:schemeClr val="bg1"/>
                 </a:solidFill>
-                <a:latin typeface="Futura Condensed"/>
-                <a:cs typeface="Futura Condensed"/>
+                <a:latin typeface="Helvetica"/>
+                <a:cs typeface="Helvetica"/>
               </a:rPr>
               <a:t>Brian Sharland</a:t>
             </a:r>
@@ -12312,7 +12314,7 @@
             </a:r>
             <a:r>
               <a:rPr lang="en-US" dirty="0" err="1" smtClean="0"/>
-              <a:t>marking_area.py</a:t>
+              <a:t>if_else_turtle.py</a:t>
             </a:r>
             <a:r>
               <a:rPr lang="en-US" dirty="0" smtClean="0"/>

</xml_diff>